<commit_message>
Updated GUI Intro in UG and PPP
</commit_message>
<xml_diff>
--- a/docs/diagrams/AllocateSequenceDiagram.pptx
+++ b/docs/diagrams/AllocateSequenceDiagram.pptx
@@ -197,7 +197,7 @@
           <a:p>
             <a:fld id="{8CC2A4DC-75EB-46D4-9B4A-352FC9F115CD}" type="datetimeFigureOut">
               <a:rPr lang="en-US" smtClean="0"/>
-              <a:t>4/2/2019</a:t>
+              <a:t>4/10/2019</a:t>
             </a:fld>
             <a:endParaRPr lang="en-US" dirty="0"/>
           </a:p>
@@ -611,7 +611,7 @@
           <a:p>
             <a:fld id="{C17442BA-8611-45A4-B205-589CF9359DD4}" type="datetimeFigureOut">
               <a:rPr lang="en-US" smtClean="0"/>
-              <a:t>4/2/2019</a:t>
+              <a:t>4/10/2019</a:t>
             </a:fld>
             <a:endParaRPr lang="en-US" dirty="0"/>
           </a:p>
@@ -809,7 +809,7 @@
           <a:p>
             <a:fld id="{C17442BA-8611-45A4-B205-589CF9359DD4}" type="datetimeFigureOut">
               <a:rPr lang="en-US" smtClean="0"/>
-              <a:t>4/2/2019</a:t>
+              <a:t>4/10/2019</a:t>
             </a:fld>
             <a:endParaRPr lang="en-US" dirty="0"/>
           </a:p>
@@ -1017,7 +1017,7 @@
           <a:p>
             <a:fld id="{C17442BA-8611-45A4-B205-589CF9359DD4}" type="datetimeFigureOut">
               <a:rPr lang="en-US" smtClean="0"/>
-              <a:t>4/2/2019</a:t>
+              <a:t>4/10/2019</a:t>
             </a:fld>
             <a:endParaRPr lang="en-US" dirty="0"/>
           </a:p>
@@ -1215,7 +1215,7 @@
           <a:p>
             <a:fld id="{C17442BA-8611-45A4-B205-589CF9359DD4}" type="datetimeFigureOut">
               <a:rPr lang="en-US" smtClean="0"/>
-              <a:t>4/2/2019</a:t>
+              <a:t>4/10/2019</a:t>
             </a:fld>
             <a:endParaRPr lang="en-US" dirty="0"/>
           </a:p>
@@ -1490,7 +1490,7 @@
           <a:p>
             <a:fld id="{C17442BA-8611-45A4-B205-589CF9359DD4}" type="datetimeFigureOut">
               <a:rPr lang="en-US" smtClean="0"/>
-              <a:t>4/2/2019</a:t>
+              <a:t>4/10/2019</a:t>
             </a:fld>
             <a:endParaRPr lang="en-US" dirty="0"/>
           </a:p>
@@ -1755,7 +1755,7 @@
           <a:p>
             <a:fld id="{C17442BA-8611-45A4-B205-589CF9359DD4}" type="datetimeFigureOut">
               <a:rPr lang="en-US" smtClean="0"/>
-              <a:t>4/2/2019</a:t>
+              <a:t>4/10/2019</a:t>
             </a:fld>
             <a:endParaRPr lang="en-US" dirty="0"/>
           </a:p>
@@ -2167,7 +2167,7 @@
           <a:p>
             <a:fld id="{C17442BA-8611-45A4-B205-589CF9359DD4}" type="datetimeFigureOut">
               <a:rPr lang="en-US" smtClean="0"/>
-              <a:t>4/2/2019</a:t>
+              <a:t>4/10/2019</a:t>
             </a:fld>
             <a:endParaRPr lang="en-US" dirty="0"/>
           </a:p>
@@ -2308,7 +2308,7 @@
           <a:p>
             <a:fld id="{C17442BA-8611-45A4-B205-589CF9359DD4}" type="datetimeFigureOut">
               <a:rPr lang="en-US" smtClean="0"/>
-              <a:t>4/2/2019</a:t>
+              <a:t>4/10/2019</a:t>
             </a:fld>
             <a:endParaRPr lang="en-US" dirty="0"/>
           </a:p>
@@ -2421,7 +2421,7 @@
           <a:p>
             <a:fld id="{C17442BA-8611-45A4-B205-589CF9359DD4}" type="datetimeFigureOut">
               <a:rPr lang="en-US" smtClean="0"/>
-              <a:t>4/2/2019</a:t>
+              <a:t>4/10/2019</a:t>
             </a:fld>
             <a:endParaRPr lang="en-US" dirty="0"/>
           </a:p>
@@ -2732,7 +2732,7 @@
           <a:p>
             <a:fld id="{C17442BA-8611-45A4-B205-589CF9359DD4}" type="datetimeFigureOut">
               <a:rPr lang="en-US" smtClean="0"/>
-              <a:t>4/2/2019</a:t>
+              <a:t>4/10/2019</a:t>
             </a:fld>
             <a:endParaRPr lang="en-US" dirty="0"/>
           </a:p>
@@ -3020,7 +3020,7 @@
           <a:p>
             <a:fld id="{C17442BA-8611-45A4-B205-589CF9359DD4}" type="datetimeFigureOut">
               <a:rPr lang="en-US" smtClean="0"/>
-              <a:t>4/2/2019</a:t>
+              <a:t>4/10/2019</a:t>
             </a:fld>
             <a:endParaRPr lang="en-US" dirty="0"/>
           </a:p>
@@ -3261,7 +3261,7 @@
           <a:p>
             <a:fld id="{C17442BA-8611-45A4-B205-589CF9359DD4}" type="datetimeFigureOut">
               <a:rPr lang="en-US" smtClean="0"/>
-              <a:t>4/2/2019</a:t>
+              <a:t>4/10/2019</a:t>
             </a:fld>
             <a:endParaRPr lang="en-US" dirty="0"/>
           </a:p>
@@ -3750,7 +3750,7 @@
         </p:nvSpPr>
         <p:spPr>
           <a:xfrm>
-            <a:off x="8718036" y="-335215"/>
+            <a:off x="8718036" y="-333763"/>
             <a:ext cx="5231602" cy="8541064"/>
           </a:xfrm>
           <a:prstGeom prst="roundRect">
@@ -3844,7 +3844,7 @@
         </p:nvSpPr>
         <p:spPr>
           <a:xfrm>
-            <a:off x="558007" y="-345454"/>
+            <a:off x="561133" y="-328266"/>
             <a:ext cx="7953655" cy="8634431"/>
           </a:xfrm>
           <a:prstGeom prst="roundRect">
@@ -4378,8 +4378,8 @@
         </p:nvSpPr>
         <p:spPr>
           <a:xfrm>
-            <a:off x="2764597" y="4497643"/>
-            <a:ext cx="855809" cy="215444"/>
+            <a:off x="2764597" y="4455960"/>
+            <a:ext cx="1275020" cy="276999"/>
           </a:xfrm>
           <a:prstGeom prst="rect">
             <a:avLst/>
@@ -4404,7 +4404,7 @@
           </a:lstStyle>
           <a:p>
             <a:r>
-              <a:rPr lang="en-US" dirty="0"/>
+              <a:rPr lang="en-US" sz="1800" dirty="0"/>
               <a:t>execute()</a:t>
             </a:r>
           </a:p>
@@ -4426,7 +4426,7 @@
         </p:nvCxnSpPr>
         <p:spPr>
           <a:xfrm>
-            <a:off x="5068187" y="1856979"/>
+            <a:off x="5068187" y="1914129"/>
             <a:ext cx="2056573" cy="0"/>
           </a:xfrm>
           <a:prstGeom prst="straightConnector1">
@@ -4812,8 +4812,8 @@
         </p:nvSpPr>
         <p:spPr>
           <a:xfrm>
-            <a:off x="3421989" y="1217197"/>
-            <a:ext cx="1357294" cy="184666"/>
+            <a:off x="3367909" y="1151043"/>
+            <a:ext cx="1587803" cy="553998"/>
           </a:xfrm>
           <a:prstGeom prst="rect">
             <a:avLst/>
@@ -4837,9 +4837,17 @@
             </a:lvl1pPr>
           </a:lstStyle>
           <a:p>
-            <a:r>
-              <a:rPr lang="en-US" sz="1200" dirty="0"/>
-              <a:t>parse(“$/10 c/Food”)</a:t>
+            <a:pPr algn="l"/>
+            <a:r>
+              <a:rPr lang="en-US" sz="1800" dirty="0"/>
+              <a:t>parse(</a:t>
+            </a:r>
+            <a:br>
+              <a:rPr lang="en-US" sz="1800" dirty="0"/>
+            </a:br>
+            <a:r>
+              <a:rPr lang="en-US" sz="1800" dirty="0"/>
+              <a:t>“$/10 c/Food”)</a:t>
             </a:r>
           </a:p>
         </p:txBody>
@@ -4858,8 +4866,8 @@
         </p:nvSpPr>
         <p:spPr>
           <a:xfrm>
-            <a:off x="1461511" y="452636"/>
-            <a:ext cx="1391716" cy="646331"/>
+            <a:off x="1470507" y="571959"/>
+            <a:ext cx="1564204" cy="830997"/>
           </a:xfrm>
           <a:prstGeom prst="rect">
             <a:avLst/>
@@ -4884,13 +4892,13 @@
           </a:lstStyle>
           <a:p>
             <a:r>
-              <a:rPr lang="en-US" dirty="0"/>
+              <a:rPr lang="en-US" sz="1800" dirty="0"/>
               <a:t>parseCommand</a:t>
             </a:r>
           </a:p>
           <a:p>
             <a:r>
-              <a:rPr lang="en-US" dirty="0"/>
+              <a:rPr lang="en-US" sz="1800" dirty="0"/>
               <a:t>(“allocate $/10 c/Food”)</a:t>
             </a:r>
           </a:p>
@@ -4911,7 +4919,7 @@
         <p:spPr>
           <a:xfrm>
             <a:off x="4193932" y="7358636"/>
-            <a:ext cx="621216" cy="215444"/>
+            <a:ext cx="621216" cy="276999"/>
           </a:xfrm>
           <a:prstGeom prst="rect">
             <a:avLst/>
@@ -4936,7 +4944,7 @@
           </a:lstStyle>
           <a:p>
             <a:r>
-              <a:rPr lang="en-US" dirty="0"/>
+              <a:rPr lang="en-US" sz="1800" dirty="0"/>
               <a:t>result</a:t>
             </a:r>
           </a:p>
@@ -4957,7 +4965,7 @@
         <p:spPr>
           <a:xfrm>
             <a:off x="462131" y="7483403"/>
-            <a:ext cx="762000" cy="215444"/>
+            <a:ext cx="762000" cy="276999"/>
           </a:xfrm>
           <a:prstGeom prst="rect">
             <a:avLst/>
@@ -4982,7 +4990,7 @@
           </a:lstStyle>
           <a:p>
             <a:r>
-              <a:rPr lang="en-US" dirty="0"/>
+              <a:rPr lang="en-US" sz="1800" dirty="0"/>
               <a:t>result</a:t>
             </a:r>
           </a:p>
@@ -5166,7 +5174,7 @@
         </p:nvCxnSpPr>
         <p:spPr>
           <a:xfrm>
-            <a:off x="3324739" y="1411516"/>
+            <a:off x="3427662" y="1412378"/>
             <a:ext cx="1597356" cy="1"/>
           </a:xfrm>
           <a:prstGeom prst="straightConnector1">
@@ -5525,8 +5533,8 @@
         </p:nvSpPr>
         <p:spPr>
           <a:xfrm>
-            <a:off x="4611439" y="1283614"/>
-            <a:ext cx="2466146" cy="338554"/>
+            <a:off x="5305105" y="1028972"/>
+            <a:ext cx="2481395" cy="646331"/>
           </a:xfrm>
           <a:prstGeom prst="rect">
             <a:avLst/>
@@ -5550,9 +5558,25 @@
             </a:lvl1pPr>
           </a:lstStyle>
           <a:p>
-            <a:r>
-              <a:rPr lang="en-US" sz="1100" dirty="0"/>
-              <a:t>tokenize(args, PREFIX_AMOUNT, PREFIX_CATEGORY);</a:t>
+            <a:pPr algn="l"/>
+            <a:r>
+              <a:rPr lang="en-US" dirty="0"/>
+              <a:t>tokenize</a:t>
+            </a:r>
+            <a:br>
+              <a:rPr lang="en-US" dirty="0"/>
+            </a:br>
+            <a:r>
+              <a:rPr lang="en-US" dirty="0"/>
+              <a:t>(</a:t>
+            </a:r>
+            <a:r>
+              <a:rPr lang="en-US" dirty="0" err="1"/>
+              <a:t>args</a:t>
+            </a:r>
+            <a:r>
+              <a:rPr lang="en-US" dirty="0"/>
+              <a:t>, PREFIX_AMOUNT, PREFIX_CATEGORY);</a:t>
             </a:r>
           </a:p>
         </p:txBody>
@@ -5735,7 +5759,7 @@
         </p:nvCxnSpPr>
         <p:spPr>
           <a:xfrm>
-            <a:off x="5107625" y="3964215"/>
+            <a:off x="5107152" y="3999143"/>
             <a:ext cx="1977695" cy="0"/>
           </a:xfrm>
           <a:prstGeom prst="straightConnector1">
@@ -5825,8 +5849,8 @@
         </p:nvSpPr>
         <p:spPr>
           <a:xfrm>
-            <a:off x="5155745" y="3782172"/>
-            <a:ext cx="1291689" cy="215444"/>
+            <a:off x="5129123" y="3756208"/>
+            <a:ext cx="1291689" cy="276999"/>
           </a:xfrm>
           <a:prstGeom prst="rect">
             <a:avLst/>
@@ -5852,7 +5876,7 @@
           <a:p>
             <a:pPr algn="ctr"/>
             <a:r>
-              <a:rPr lang="en-US" dirty="0"/>
+              <a:rPr lang="en-US" sz="1800" dirty="0"/>
               <a:t>a</a:t>
             </a:r>
           </a:p>
@@ -6015,8 +6039,8 @@
         </p:nvSpPr>
         <p:spPr>
           <a:xfrm>
-            <a:off x="-1643721" y="530618"/>
-            <a:ext cx="2818918" cy="430887"/>
+            <a:off x="-1548152" y="519587"/>
+            <a:ext cx="2818918" cy="553998"/>
           </a:xfrm>
           <a:prstGeom prst="rect">
             <a:avLst/>
@@ -6031,7 +6055,7 @@
           <a:p>
             <a:pPr algn="r"/>
             <a:r>
-              <a:rPr lang="en-US" sz="1400" dirty="0">
+              <a:rPr lang="en-US" dirty="0">
                 <a:solidFill>
                   <a:srgbClr val="0070C0"/>
                 </a:solidFill>
@@ -6039,14 +6063,14 @@
               <a:t>execute(“allocate </a:t>
             </a:r>
             <a:br>
-              <a:rPr lang="en-US" sz="1400" dirty="0">
+              <a:rPr lang="en-US" dirty="0">
                 <a:solidFill>
                   <a:srgbClr val="0070C0"/>
                 </a:solidFill>
               </a:rPr>
             </a:br>
             <a:r>
-              <a:rPr lang="en-US" sz="1400" dirty="0">
+              <a:rPr lang="en-US" dirty="0">
                 <a:solidFill>
                   <a:srgbClr val="0070C0"/>
                 </a:solidFill>
@@ -6115,8 +6139,8 @@
         </p:nvSpPr>
         <p:spPr>
           <a:xfrm>
-            <a:off x="7124760" y="1594305"/>
-            <a:ext cx="207920" cy="262674"/>
+            <a:off x="7124760" y="1594304"/>
+            <a:ext cx="206374" cy="332621"/>
           </a:xfrm>
           <a:prstGeom prst="rect">
             <a:avLst/>
@@ -6168,8 +6192,8 @@
         </p:nvSpPr>
         <p:spPr>
           <a:xfrm>
-            <a:off x="5440054" y="1655646"/>
-            <a:ext cx="1201243" cy="169277"/>
+            <a:off x="5213677" y="1682235"/>
+            <a:ext cx="1911083" cy="246221"/>
           </a:xfrm>
           <a:prstGeom prst="rect">
             <a:avLst/>
@@ -6193,10 +6217,12 @@
             </a:lvl1pPr>
           </a:lstStyle>
           <a:p>
-            <a:r>
-              <a:rPr lang="en-US" sz="1100" dirty="0"/>
+            <a:pPr algn="ctr"/>
+            <a:r>
+              <a:rPr lang="en-US" sz="1600" dirty="0"/>
               <a:t>ArgumentMultimap</a:t>
             </a:r>
+            <a:endParaRPr lang="en-US" sz="1800" dirty="0"/>
           </a:p>
         </p:txBody>
       </p:sp>
@@ -6215,7 +6241,7 @@
         <p:spPr>
           <a:xfrm>
             <a:off x="5277957" y="2077119"/>
-            <a:ext cx="3470744" cy="169277"/>
+            <a:ext cx="3470744" cy="338554"/>
           </a:xfrm>
           <a:prstGeom prst="rect">
             <a:avLst/>
@@ -6241,8 +6267,20 @@
           <a:p>
             <a:pPr algn="l"/>
             <a:r>
+              <a:rPr lang="en-SG" sz="1100" dirty="0" err="1"/>
+              <a:t>arePrefixesPresent</a:t>
+            </a:r>
+            <a:r>
               <a:rPr lang="en-SG" sz="1100" dirty="0"/>
-              <a:t>ArgumentMultimap, PREFIX_AMOUNT, PREFIX_CATEGORY)</a:t>
+              <a:t>(</a:t>
+            </a:r>
+            <a:r>
+              <a:rPr lang="en-SG" sz="1100" dirty="0" err="1"/>
+              <a:t>ArgumentMultimap</a:t>
+            </a:r>
+            <a:r>
+              <a:rPr lang="en-SG" sz="1100" dirty="0"/>
+              <a:t>, PREFIX_AMOUNT, PREFIX_CATEGORY)</a:t>
             </a:r>
             <a:endParaRPr lang="en-US" sz="1100" dirty="0"/>
           </a:p>
@@ -6373,7 +6411,7 @@
         <p:spPr>
           <a:xfrm>
             <a:off x="7255131" y="5223558"/>
-            <a:ext cx="1912488" cy="338554"/>
+            <a:ext cx="1912488" cy="646331"/>
           </a:xfrm>
           <a:prstGeom prst="rect">
             <a:avLst/>
@@ -6399,14 +6437,14 @@
           <a:p>
             <a:pPr algn="ctr"/>
             <a:r>
-              <a:rPr lang="en-US" sz="1100" dirty="0"/>
+              <a:rPr lang="en-US" dirty="0"/>
               <a:t>addCategoryBudget</a:t>
             </a:r>
             <a:br>
-              <a:rPr lang="en-US" sz="1100" dirty="0"/>
+              <a:rPr lang="en-US" dirty="0"/>
             </a:br>
             <a:r>
-              <a:rPr lang="en-US" sz="1100" dirty="0"/>
+              <a:rPr lang="en-US" dirty="0"/>
               <a:t>(CategoryBudget catBudget)</a:t>
             </a:r>
           </a:p>
@@ -6722,7 +6760,7 @@
         <p:spPr>
           <a:xfrm>
             <a:off x="3460986" y="3881391"/>
-            <a:ext cx="1291689" cy="215444"/>
+            <a:ext cx="1291689" cy="276999"/>
           </a:xfrm>
           <a:prstGeom prst="rect">
             <a:avLst/>
@@ -6748,7 +6786,7 @@
           <a:p>
             <a:pPr algn="ctr"/>
             <a:r>
-              <a:rPr lang="en-US" dirty="0"/>
+              <a:rPr lang="en-US" sz="1800" dirty="0"/>
               <a:t>a</a:t>
             </a:r>
           </a:p>
@@ -6768,8 +6806,8 @@
         </p:nvSpPr>
         <p:spPr>
           <a:xfrm>
-            <a:off x="1618430" y="4084871"/>
-            <a:ext cx="1291689" cy="215444"/>
+            <a:off x="1620181" y="3999143"/>
+            <a:ext cx="1291689" cy="276999"/>
           </a:xfrm>
           <a:prstGeom prst="rect">
             <a:avLst/>
@@ -6795,7 +6833,7 @@
           <a:p>
             <a:pPr algn="ctr"/>
             <a:r>
-              <a:rPr lang="en-US" dirty="0"/>
+              <a:rPr lang="en-US" sz="1800" dirty="0"/>
               <a:t>a</a:t>
             </a:r>
           </a:p>
@@ -6905,8 +6943,8 @@
         </p:nvSpPr>
         <p:spPr>
           <a:xfrm>
-            <a:off x="9448730" y="5386595"/>
-            <a:ext cx="1912488" cy="338554"/>
+            <a:off x="9448171" y="5302513"/>
+            <a:ext cx="1912488" cy="738664"/>
           </a:xfrm>
           <a:prstGeom prst="rect">
             <a:avLst/>
@@ -6932,7 +6970,7 @@
           <a:p>
             <a:pPr algn="ctr"/>
             <a:r>
-              <a:rPr lang="en-US" sz="1100" dirty="0">
+              <a:rPr lang="en-US" sz="1600" dirty="0">
                 <a:solidFill>
                   <a:srgbClr val="7030A0"/>
                 </a:solidFill>
@@ -6940,14 +6978,14 @@
               <a:t>addCategoryBudget</a:t>
             </a:r>
             <a:br>
-              <a:rPr lang="en-US" sz="1100" dirty="0">
+              <a:rPr lang="en-US" sz="1600" dirty="0">
                 <a:solidFill>
                   <a:srgbClr val="7030A0"/>
                 </a:solidFill>
               </a:rPr>
             </a:br>
             <a:r>
-              <a:rPr lang="en-US" sz="1100" dirty="0">
+              <a:rPr lang="en-US" sz="1600" dirty="0">
                 <a:solidFill>
                   <a:srgbClr val="7030A0"/>
                 </a:solidFill>
@@ -7134,7 +7172,7 @@
         </p:nvSpPr>
         <p:spPr>
           <a:xfrm>
-            <a:off x="12171029" y="5184080"/>
+            <a:off x="12496434" y="4743873"/>
             <a:ext cx="1380765" cy="405029"/>
           </a:xfrm>
           <a:prstGeom prst="rect">
@@ -7202,7 +7240,7 @@
         </p:nvCxnSpPr>
         <p:spPr>
           <a:xfrm>
-            <a:off x="12861412" y="5589109"/>
+            <a:off x="13186817" y="5148902"/>
             <a:ext cx="0" cy="1486867"/>
           </a:xfrm>
           <a:prstGeom prst="line">
@@ -7246,9 +7284,9 @@
           <p:nvPr/>
         </p:nvCxnSpPr>
         <p:spPr>
-          <a:xfrm>
-            <a:off x="11256769" y="5741210"/>
-            <a:ext cx="1533872" cy="0"/>
+          <a:xfrm flipV="1">
+            <a:off x="11282145" y="5671498"/>
+            <a:ext cx="1860312" cy="5822"/>
           </a:xfrm>
           <a:prstGeom prst="straightConnector1">
             <a:avLst/>
@@ -7289,7 +7327,7 @@
         </p:nvSpPr>
         <p:spPr>
           <a:xfrm>
-            <a:off x="12790641" y="5735388"/>
+            <a:off x="13120573" y="5654143"/>
             <a:ext cx="139471" cy="241150"/>
           </a:xfrm>
           <a:prstGeom prst="rect">
@@ -7342,8 +7380,8 @@
         </p:nvSpPr>
         <p:spPr>
           <a:xfrm>
-            <a:off x="11130503" y="5571522"/>
-            <a:ext cx="1912488" cy="307777"/>
+            <a:off x="11282145" y="5212757"/>
+            <a:ext cx="1912488" cy="646331"/>
           </a:xfrm>
           <a:prstGeom prst="rect">
             <a:avLst/>
@@ -7369,7 +7407,7 @@
           <a:p>
             <a:pPr algn="ctr"/>
             <a:r>
-              <a:rPr lang="en-US" sz="1000" dirty="0">
+              <a:rPr lang="en-US" dirty="0">
                 <a:solidFill>
                   <a:srgbClr val="7030A0"/>
                 </a:solidFill>
@@ -7377,14 +7415,14 @@
               <a:t>setNewCategoryBudget</a:t>
             </a:r>
             <a:br>
-              <a:rPr lang="en-US" sz="1000" dirty="0">
+              <a:rPr lang="en-US" dirty="0">
                 <a:solidFill>
                   <a:srgbClr val="7030A0"/>
                 </a:solidFill>
               </a:rPr>
             </a:br>
             <a:r>
-              <a:rPr lang="en-US" sz="1000" dirty="0">
+              <a:rPr lang="en-US" dirty="0">
                 <a:solidFill>
                   <a:srgbClr val="7030A0"/>
                 </a:solidFill>
@@ -7410,8 +7448,8 @@
         </p:nvCxnSpPr>
         <p:spPr>
           <a:xfrm>
-            <a:off x="11355858" y="5966564"/>
-            <a:ext cx="1429423" cy="0"/>
+            <a:off x="11311498" y="5880531"/>
+            <a:ext cx="1830959" cy="9974"/>
           </a:xfrm>
           <a:prstGeom prst="straightConnector1">
             <a:avLst/>

</xml_diff>

<commit_message>
Merge https://github.com/CS2103-AY1819S2-W17-3/main into week12
# Conflicts:
#	src/test/java/seedu/finance/testutil/TypicalRecords.java
</commit_message>
<xml_diff>
--- a/docs/diagrams/AllocateSequenceDiagram.pptx
+++ b/docs/diagrams/AllocateSequenceDiagram.pptx
@@ -197,7 +197,7 @@
           <a:p>
             <a:fld id="{8CC2A4DC-75EB-46D4-9B4A-352FC9F115CD}" type="datetimeFigureOut">
               <a:rPr lang="en-US" smtClean="0"/>
-              <a:t>4/2/2019</a:t>
+              <a:t>4/10/2019</a:t>
             </a:fld>
             <a:endParaRPr lang="en-US" dirty="0"/>
           </a:p>
@@ -611,7 +611,7 @@
           <a:p>
             <a:fld id="{C17442BA-8611-45A4-B205-589CF9359DD4}" type="datetimeFigureOut">
               <a:rPr lang="en-US" smtClean="0"/>
-              <a:t>4/2/2019</a:t>
+              <a:t>4/10/2019</a:t>
             </a:fld>
             <a:endParaRPr lang="en-US" dirty="0"/>
           </a:p>
@@ -809,7 +809,7 @@
           <a:p>
             <a:fld id="{C17442BA-8611-45A4-B205-589CF9359DD4}" type="datetimeFigureOut">
               <a:rPr lang="en-US" smtClean="0"/>
-              <a:t>4/2/2019</a:t>
+              <a:t>4/10/2019</a:t>
             </a:fld>
             <a:endParaRPr lang="en-US" dirty="0"/>
           </a:p>
@@ -1017,7 +1017,7 @@
           <a:p>
             <a:fld id="{C17442BA-8611-45A4-B205-589CF9359DD4}" type="datetimeFigureOut">
               <a:rPr lang="en-US" smtClean="0"/>
-              <a:t>4/2/2019</a:t>
+              <a:t>4/10/2019</a:t>
             </a:fld>
             <a:endParaRPr lang="en-US" dirty="0"/>
           </a:p>
@@ -1215,7 +1215,7 @@
           <a:p>
             <a:fld id="{C17442BA-8611-45A4-B205-589CF9359DD4}" type="datetimeFigureOut">
               <a:rPr lang="en-US" smtClean="0"/>
-              <a:t>4/2/2019</a:t>
+              <a:t>4/10/2019</a:t>
             </a:fld>
             <a:endParaRPr lang="en-US" dirty="0"/>
           </a:p>
@@ -1490,7 +1490,7 @@
           <a:p>
             <a:fld id="{C17442BA-8611-45A4-B205-589CF9359DD4}" type="datetimeFigureOut">
               <a:rPr lang="en-US" smtClean="0"/>
-              <a:t>4/2/2019</a:t>
+              <a:t>4/10/2019</a:t>
             </a:fld>
             <a:endParaRPr lang="en-US" dirty="0"/>
           </a:p>
@@ -1755,7 +1755,7 @@
           <a:p>
             <a:fld id="{C17442BA-8611-45A4-B205-589CF9359DD4}" type="datetimeFigureOut">
               <a:rPr lang="en-US" smtClean="0"/>
-              <a:t>4/2/2019</a:t>
+              <a:t>4/10/2019</a:t>
             </a:fld>
             <a:endParaRPr lang="en-US" dirty="0"/>
           </a:p>
@@ -2167,7 +2167,7 @@
           <a:p>
             <a:fld id="{C17442BA-8611-45A4-B205-589CF9359DD4}" type="datetimeFigureOut">
               <a:rPr lang="en-US" smtClean="0"/>
-              <a:t>4/2/2019</a:t>
+              <a:t>4/10/2019</a:t>
             </a:fld>
             <a:endParaRPr lang="en-US" dirty="0"/>
           </a:p>
@@ -2308,7 +2308,7 @@
           <a:p>
             <a:fld id="{C17442BA-8611-45A4-B205-589CF9359DD4}" type="datetimeFigureOut">
               <a:rPr lang="en-US" smtClean="0"/>
-              <a:t>4/2/2019</a:t>
+              <a:t>4/10/2019</a:t>
             </a:fld>
             <a:endParaRPr lang="en-US" dirty="0"/>
           </a:p>
@@ -2421,7 +2421,7 @@
           <a:p>
             <a:fld id="{C17442BA-8611-45A4-B205-589CF9359DD4}" type="datetimeFigureOut">
               <a:rPr lang="en-US" smtClean="0"/>
-              <a:t>4/2/2019</a:t>
+              <a:t>4/10/2019</a:t>
             </a:fld>
             <a:endParaRPr lang="en-US" dirty="0"/>
           </a:p>
@@ -2732,7 +2732,7 @@
           <a:p>
             <a:fld id="{C17442BA-8611-45A4-B205-589CF9359DD4}" type="datetimeFigureOut">
               <a:rPr lang="en-US" smtClean="0"/>
-              <a:t>4/2/2019</a:t>
+              <a:t>4/10/2019</a:t>
             </a:fld>
             <a:endParaRPr lang="en-US" dirty="0"/>
           </a:p>
@@ -3020,7 +3020,7 @@
           <a:p>
             <a:fld id="{C17442BA-8611-45A4-B205-589CF9359DD4}" type="datetimeFigureOut">
               <a:rPr lang="en-US" smtClean="0"/>
-              <a:t>4/2/2019</a:t>
+              <a:t>4/10/2019</a:t>
             </a:fld>
             <a:endParaRPr lang="en-US" dirty="0"/>
           </a:p>
@@ -3261,7 +3261,7 @@
           <a:p>
             <a:fld id="{C17442BA-8611-45A4-B205-589CF9359DD4}" type="datetimeFigureOut">
               <a:rPr lang="en-US" smtClean="0"/>
-              <a:t>4/2/2019</a:t>
+              <a:t>4/10/2019</a:t>
             </a:fld>
             <a:endParaRPr lang="en-US" dirty="0"/>
           </a:p>
@@ -3750,7 +3750,7 @@
         </p:nvSpPr>
         <p:spPr>
           <a:xfrm>
-            <a:off x="8718036" y="-335215"/>
+            <a:off x="8718036" y="-333763"/>
             <a:ext cx="5231602" cy="8541064"/>
           </a:xfrm>
           <a:prstGeom prst="roundRect">
@@ -3844,7 +3844,7 @@
         </p:nvSpPr>
         <p:spPr>
           <a:xfrm>
-            <a:off x="558007" y="-345454"/>
+            <a:off x="561133" y="-328266"/>
             <a:ext cx="7953655" cy="8634431"/>
           </a:xfrm>
           <a:prstGeom prst="roundRect">
@@ -4378,8 +4378,8 @@
         </p:nvSpPr>
         <p:spPr>
           <a:xfrm>
-            <a:off x="2764597" y="4497643"/>
-            <a:ext cx="855809" cy="215444"/>
+            <a:off x="2764597" y="4455960"/>
+            <a:ext cx="1275020" cy="276999"/>
           </a:xfrm>
           <a:prstGeom prst="rect">
             <a:avLst/>
@@ -4404,7 +4404,7 @@
           </a:lstStyle>
           <a:p>
             <a:r>
-              <a:rPr lang="en-US" dirty="0"/>
+              <a:rPr lang="en-US" sz="1800" dirty="0"/>
               <a:t>execute()</a:t>
             </a:r>
           </a:p>
@@ -4426,7 +4426,7 @@
         </p:nvCxnSpPr>
         <p:spPr>
           <a:xfrm>
-            <a:off x="5068187" y="1856979"/>
+            <a:off x="5068187" y="1914129"/>
             <a:ext cx="2056573" cy="0"/>
           </a:xfrm>
           <a:prstGeom prst="straightConnector1">
@@ -4812,8 +4812,8 @@
         </p:nvSpPr>
         <p:spPr>
           <a:xfrm>
-            <a:off x="3421989" y="1217197"/>
-            <a:ext cx="1357294" cy="184666"/>
+            <a:off x="3367909" y="1151043"/>
+            <a:ext cx="1587803" cy="553998"/>
           </a:xfrm>
           <a:prstGeom prst="rect">
             <a:avLst/>
@@ -4837,9 +4837,17 @@
             </a:lvl1pPr>
           </a:lstStyle>
           <a:p>
-            <a:r>
-              <a:rPr lang="en-US" sz="1200" dirty="0"/>
-              <a:t>parse(“$/10 c/Food”)</a:t>
+            <a:pPr algn="l"/>
+            <a:r>
+              <a:rPr lang="en-US" sz="1800" dirty="0"/>
+              <a:t>parse(</a:t>
+            </a:r>
+            <a:br>
+              <a:rPr lang="en-US" sz="1800" dirty="0"/>
+            </a:br>
+            <a:r>
+              <a:rPr lang="en-US" sz="1800" dirty="0"/>
+              <a:t>“$/10 c/Food”)</a:t>
             </a:r>
           </a:p>
         </p:txBody>
@@ -4858,8 +4866,8 @@
         </p:nvSpPr>
         <p:spPr>
           <a:xfrm>
-            <a:off x="1461511" y="452636"/>
-            <a:ext cx="1391716" cy="646331"/>
+            <a:off x="1470507" y="571959"/>
+            <a:ext cx="1564204" cy="830997"/>
           </a:xfrm>
           <a:prstGeom prst="rect">
             <a:avLst/>
@@ -4884,13 +4892,13 @@
           </a:lstStyle>
           <a:p>
             <a:r>
-              <a:rPr lang="en-US" dirty="0"/>
+              <a:rPr lang="en-US" sz="1800" dirty="0"/>
               <a:t>parseCommand</a:t>
             </a:r>
           </a:p>
           <a:p>
             <a:r>
-              <a:rPr lang="en-US" dirty="0"/>
+              <a:rPr lang="en-US" sz="1800" dirty="0"/>
               <a:t>(“allocate $/10 c/Food”)</a:t>
             </a:r>
           </a:p>
@@ -4911,7 +4919,7 @@
         <p:spPr>
           <a:xfrm>
             <a:off x="4193932" y="7358636"/>
-            <a:ext cx="621216" cy="215444"/>
+            <a:ext cx="621216" cy="276999"/>
           </a:xfrm>
           <a:prstGeom prst="rect">
             <a:avLst/>
@@ -4936,7 +4944,7 @@
           </a:lstStyle>
           <a:p>
             <a:r>
-              <a:rPr lang="en-US" dirty="0"/>
+              <a:rPr lang="en-US" sz="1800" dirty="0"/>
               <a:t>result</a:t>
             </a:r>
           </a:p>
@@ -4957,7 +4965,7 @@
         <p:spPr>
           <a:xfrm>
             <a:off x="462131" y="7483403"/>
-            <a:ext cx="762000" cy="215444"/>
+            <a:ext cx="762000" cy="276999"/>
           </a:xfrm>
           <a:prstGeom prst="rect">
             <a:avLst/>
@@ -4982,7 +4990,7 @@
           </a:lstStyle>
           <a:p>
             <a:r>
-              <a:rPr lang="en-US" dirty="0"/>
+              <a:rPr lang="en-US" sz="1800" dirty="0"/>
               <a:t>result</a:t>
             </a:r>
           </a:p>
@@ -5166,7 +5174,7 @@
         </p:nvCxnSpPr>
         <p:spPr>
           <a:xfrm>
-            <a:off x="3324739" y="1411516"/>
+            <a:off x="3427662" y="1412378"/>
             <a:ext cx="1597356" cy="1"/>
           </a:xfrm>
           <a:prstGeom prst="straightConnector1">
@@ -5525,8 +5533,8 @@
         </p:nvSpPr>
         <p:spPr>
           <a:xfrm>
-            <a:off x="4611439" y="1283614"/>
-            <a:ext cx="2466146" cy="338554"/>
+            <a:off x="5305105" y="1028972"/>
+            <a:ext cx="2481395" cy="646331"/>
           </a:xfrm>
           <a:prstGeom prst="rect">
             <a:avLst/>
@@ -5550,9 +5558,25 @@
             </a:lvl1pPr>
           </a:lstStyle>
           <a:p>
-            <a:r>
-              <a:rPr lang="en-US" sz="1100" dirty="0"/>
-              <a:t>tokenize(args, PREFIX_AMOUNT, PREFIX_CATEGORY);</a:t>
+            <a:pPr algn="l"/>
+            <a:r>
+              <a:rPr lang="en-US" dirty="0"/>
+              <a:t>tokenize</a:t>
+            </a:r>
+            <a:br>
+              <a:rPr lang="en-US" dirty="0"/>
+            </a:br>
+            <a:r>
+              <a:rPr lang="en-US" dirty="0"/>
+              <a:t>(</a:t>
+            </a:r>
+            <a:r>
+              <a:rPr lang="en-US" dirty="0" err="1"/>
+              <a:t>args</a:t>
+            </a:r>
+            <a:r>
+              <a:rPr lang="en-US" dirty="0"/>
+              <a:t>, PREFIX_AMOUNT, PREFIX_CATEGORY);</a:t>
             </a:r>
           </a:p>
         </p:txBody>
@@ -5735,7 +5759,7 @@
         </p:nvCxnSpPr>
         <p:spPr>
           <a:xfrm>
-            <a:off x="5107625" y="3964215"/>
+            <a:off x="5107152" y="3999143"/>
             <a:ext cx="1977695" cy="0"/>
           </a:xfrm>
           <a:prstGeom prst="straightConnector1">
@@ -5825,8 +5849,8 @@
         </p:nvSpPr>
         <p:spPr>
           <a:xfrm>
-            <a:off x="5155745" y="3782172"/>
-            <a:ext cx="1291689" cy="215444"/>
+            <a:off x="5129123" y="3756208"/>
+            <a:ext cx="1291689" cy="276999"/>
           </a:xfrm>
           <a:prstGeom prst="rect">
             <a:avLst/>
@@ -5852,7 +5876,7 @@
           <a:p>
             <a:pPr algn="ctr"/>
             <a:r>
-              <a:rPr lang="en-US" dirty="0"/>
+              <a:rPr lang="en-US" sz="1800" dirty="0"/>
               <a:t>a</a:t>
             </a:r>
           </a:p>
@@ -6015,8 +6039,8 @@
         </p:nvSpPr>
         <p:spPr>
           <a:xfrm>
-            <a:off x="-1643721" y="530618"/>
-            <a:ext cx="2818918" cy="430887"/>
+            <a:off x="-1548152" y="519587"/>
+            <a:ext cx="2818918" cy="553998"/>
           </a:xfrm>
           <a:prstGeom prst="rect">
             <a:avLst/>
@@ -6031,7 +6055,7 @@
           <a:p>
             <a:pPr algn="r"/>
             <a:r>
-              <a:rPr lang="en-US" sz="1400" dirty="0">
+              <a:rPr lang="en-US" dirty="0">
                 <a:solidFill>
                   <a:srgbClr val="0070C0"/>
                 </a:solidFill>
@@ -6039,14 +6063,14 @@
               <a:t>execute(“allocate </a:t>
             </a:r>
             <a:br>
-              <a:rPr lang="en-US" sz="1400" dirty="0">
+              <a:rPr lang="en-US" dirty="0">
                 <a:solidFill>
                   <a:srgbClr val="0070C0"/>
                 </a:solidFill>
               </a:rPr>
             </a:br>
             <a:r>
-              <a:rPr lang="en-US" sz="1400" dirty="0">
+              <a:rPr lang="en-US" dirty="0">
                 <a:solidFill>
                   <a:srgbClr val="0070C0"/>
                 </a:solidFill>
@@ -6115,8 +6139,8 @@
         </p:nvSpPr>
         <p:spPr>
           <a:xfrm>
-            <a:off x="7124760" y="1594305"/>
-            <a:ext cx="207920" cy="262674"/>
+            <a:off x="7124760" y="1594304"/>
+            <a:ext cx="206374" cy="332621"/>
           </a:xfrm>
           <a:prstGeom prst="rect">
             <a:avLst/>
@@ -6168,8 +6192,8 @@
         </p:nvSpPr>
         <p:spPr>
           <a:xfrm>
-            <a:off x="5440054" y="1655646"/>
-            <a:ext cx="1201243" cy="169277"/>
+            <a:off x="5213677" y="1682235"/>
+            <a:ext cx="1911083" cy="246221"/>
           </a:xfrm>
           <a:prstGeom prst="rect">
             <a:avLst/>
@@ -6193,10 +6217,12 @@
             </a:lvl1pPr>
           </a:lstStyle>
           <a:p>
-            <a:r>
-              <a:rPr lang="en-US" sz="1100" dirty="0"/>
+            <a:pPr algn="ctr"/>
+            <a:r>
+              <a:rPr lang="en-US" sz="1600" dirty="0"/>
               <a:t>ArgumentMultimap</a:t>
             </a:r>
+            <a:endParaRPr lang="en-US" sz="1800" dirty="0"/>
           </a:p>
         </p:txBody>
       </p:sp>
@@ -6215,7 +6241,7 @@
         <p:spPr>
           <a:xfrm>
             <a:off x="5277957" y="2077119"/>
-            <a:ext cx="3470744" cy="169277"/>
+            <a:ext cx="3470744" cy="338554"/>
           </a:xfrm>
           <a:prstGeom prst="rect">
             <a:avLst/>
@@ -6241,8 +6267,20 @@
           <a:p>
             <a:pPr algn="l"/>
             <a:r>
+              <a:rPr lang="en-SG" sz="1100" dirty="0" err="1"/>
+              <a:t>arePrefixesPresent</a:t>
+            </a:r>
+            <a:r>
               <a:rPr lang="en-SG" sz="1100" dirty="0"/>
-              <a:t>ArgumentMultimap, PREFIX_AMOUNT, PREFIX_CATEGORY)</a:t>
+              <a:t>(</a:t>
+            </a:r>
+            <a:r>
+              <a:rPr lang="en-SG" sz="1100" dirty="0" err="1"/>
+              <a:t>ArgumentMultimap</a:t>
+            </a:r>
+            <a:r>
+              <a:rPr lang="en-SG" sz="1100" dirty="0"/>
+              <a:t>, PREFIX_AMOUNT, PREFIX_CATEGORY)</a:t>
             </a:r>
             <a:endParaRPr lang="en-US" sz="1100" dirty="0"/>
           </a:p>
@@ -6373,7 +6411,7 @@
         <p:spPr>
           <a:xfrm>
             <a:off x="7255131" y="5223558"/>
-            <a:ext cx="1912488" cy="338554"/>
+            <a:ext cx="1912488" cy="646331"/>
           </a:xfrm>
           <a:prstGeom prst="rect">
             <a:avLst/>
@@ -6399,14 +6437,14 @@
           <a:p>
             <a:pPr algn="ctr"/>
             <a:r>
-              <a:rPr lang="en-US" sz="1100" dirty="0"/>
+              <a:rPr lang="en-US" dirty="0"/>
               <a:t>addCategoryBudget</a:t>
             </a:r>
             <a:br>
-              <a:rPr lang="en-US" sz="1100" dirty="0"/>
+              <a:rPr lang="en-US" dirty="0"/>
             </a:br>
             <a:r>
-              <a:rPr lang="en-US" sz="1100" dirty="0"/>
+              <a:rPr lang="en-US" dirty="0"/>
               <a:t>(CategoryBudget catBudget)</a:t>
             </a:r>
           </a:p>
@@ -6722,7 +6760,7 @@
         <p:spPr>
           <a:xfrm>
             <a:off x="3460986" y="3881391"/>
-            <a:ext cx="1291689" cy="215444"/>
+            <a:ext cx="1291689" cy="276999"/>
           </a:xfrm>
           <a:prstGeom prst="rect">
             <a:avLst/>
@@ -6748,7 +6786,7 @@
           <a:p>
             <a:pPr algn="ctr"/>
             <a:r>
-              <a:rPr lang="en-US" dirty="0"/>
+              <a:rPr lang="en-US" sz="1800" dirty="0"/>
               <a:t>a</a:t>
             </a:r>
           </a:p>
@@ -6768,8 +6806,8 @@
         </p:nvSpPr>
         <p:spPr>
           <a:xfrm>
-            <a:off x="1618430" y="4084871"/>
-            <a:ext cx="1291689" cy="215444"/>
+            <a:off x="1620181" y="3999143"/>
+            <a:ext cx="1291689" cy="276999"/>
           </a:xfrm>
           <a:prstGeom prst="rect">
             <a:avLst/>
@@ -6795,7 +6833,7 @@
           <a:p>
             <a:pPr algn="ctr"/>
             <a:r>
-              <a:rPr lang="en-US" dirty="0"/>
+              <a:rPr lang="en-US" sz="1800" dirty="0"/>
               <a:t>a</a:t>
             </a:r>
           </a:p>
@@ -6905,8 +6943,8 @@
         </p:nvSpPr>
         <p:spPr>
           <a:xfrm>
-            <a:off x="9448730" y="5386595"/>
-            <a:ext cx="1912488" cy="338554"/>
+            <a:off x="9448171" y="5302513"/>
+            <a:ext cx="1912488" cy="738664"/>
           </a:xfrm>
           <a:prstGeom prst="rect">
             <a:avLst/>
@@ -6932,7 +6970,7 @@
           <a:p>
             <a:pPr algn="ctr"/>
             <a:r>
-              <a:rPr lang="en-US" sz="1100" dirty="0">
+              <a:rPr lang="en-US" sz="1600" dirty="0">
                 <a:solidFill>
                   <a:srgbClr val="7030A0"/>
                 </a:solidFill>
@@ -6940,14 +6978,14 @@
               <a:t>addCategoryBudget</a:t>
             </a:r>
             <a:br>
-              <a:rPr lang="en-US" sz="1100" dirty="0">
+              <a:rPr lang="en-US" sz="1600" dirty="0">
                 <a:solidFill>
                   <a:srgbClr val="7030A0"/>
                 </a:solidFill>
               </a:rPr>
             </a:br>
             <a:r>
-              <a:rPr lang="en-US" sz="1100" dirty="0">
+              <a:rPr lang="en-US" sz="1600" dirty="0">
                 <a:solidFill>
                   <a:srgbClr val="7030A0"/>
                 </a:solidFill>
@@ -7134,7 +7172,7 @@
         </p:nvSpPr>
         <p:spPr>
           <a:xfrm>
-            <a:off x="12171029" y="5184080"/>
+            <a:off x="12496434" y="4743873"/>
             <a:ext cx="1380765" cy="405029"/>
           </a:xfrm>
           <a:prstGeom prst="rect">
@@ -7202,7 +7240,7 @@
         </p:nvCxnSpPr>
         <p:spPr>
           <a:xfrm>
-            <a:off x="12861412" y="5589109"/>
+            <a:off x="13186817" y="5148902"/>
             <a:ext cx="0" cy="1486867"/>
           </a:xfrm>
           <a:prstGeom prst="line">
@@ -7246,9 +7284,9 @@
           <p:nvPr/>
         </p:nvCxnSpPr>
         <p:spPr>
-          <a:xfrm>
-            <a:off x="11256769" y="5741210"/>
-            <a:ext cx="1533872" cy="0"/>
+          <a:xfrm flipV="1">
+            <a:off x="11282145" y="5671498"/>
+            <a:ext cx="1860312" cy="5822"/>
           </a:xfrm>
           <a:prstGeom prst="straightConnector1">
             <a:avLst/>
@@ -7289,7 +7327,7 @@
         </p:nvSpPr>
         <p:spPr>
           <a:xfrm>
-            <a:off x="12790641" y="5735388"/>
+            <a:off x="13120573" y="5654143"/>
             <a:ext cx="139471" cy="241150"/>
           </a:xfrm>
           <a:prstGeom prst="rect">
@@ -7342,8 +7380,8 @@
         </p:nvSpPr>
         <p:spPr>
           <a:xfrm>
-            <a:off x="11130503" y="5571522"/>
-            <a:ext cx="1912488" cy="307777"/>
+            <a:off x="11282145" y="5212757"/>
+            <a:ext cx="1912488" cy="646331"/>
           </a:xfrm>
           <a:prstGeom prst="rect">
             <a:avLst/>
@@ -7369,7 +7407,7 @@
           <a:p>
             <a:pPr algn="ctr"/>
             <a:r>
-              <a:rPr lang="en-US" sz="1000" dirty="0">
+              <a:rPr lang="en-US" dirty="0">
                 <a:solidFill>
                   <a:srgbClr val="7030A0"/>
                 </a:solidFill>
@@ -7377,14 +7415,14 @@
               <a:t>setNewCategoryBudget</a:t>
             </a:r>
             <a:br>
-              <a:rPr lang="en-US" sz="1000" dirty="0">
+              <a:rPr lang="en-US" dirty="0">
                 <a:solidFill>
                   <a:srgbClr val="7030A0"/>
                 </a:solidFill>
               </a:rPr>
             </a:br>
             <a:r>
-              <a:rPr lang="en-US" sz="1000" dirty="0">
+              <a:rPr lang="en-US" dirty="0">
                 <a:solidFill>
                   <a:srgbClr val="7030A0"/>
                 </a:solidFill>
@@ -7410,8 +7448,8 @@
         </p:nvCxnSpPr>
         <p:spPr>
           <a:xfrm>
-            <a:off x="11355858" y="5966564"/>
-            <a:ext cx="1429423" cy="0"/>
+            <a:off x="11311498" y="5880531"/>
+            <a:ext cx="1830959" cy="9974"/>
           </a:xfrm>
           <a:prstGeom prst="straightConnector1">
             <a:avLst/>

</xml_diff>

<commit_message>
Updated UG, PPP, DG
</commit_message>
<xml_diff>
--- a/docs/diagrams/AllocateSequenceDiagram.pptx
+++ b/docs/diagrams/AllocateSequenceDiagram.pptx
@@ -197,7 +197,7 @@
           <a:p>
             <a:fld id="{8CC2A4DC-75EB-46D4-9B4A-352FC9F115CD}" type="datetimeFigureOut">
               <a:rPr lang="en-US" smtClean="0"/>
-              <a:t>4/10/2019</a:t>
+              <a:t>4/14/2019</a:t>
             </a:fld>
             <a:endParaRPr lang="en-US" dirty="0"/>
           </a:p>
@@ -611,7 +611,7 @@
           <a:p>
             <a:fld id="{C17442BA-8611-45A4-B205-589CF9359DD4}" type="datetimeFigureOut">
               <a:rPr lang="en-US" smtClean="0"/>
-              <a:t>4/10/2019</a:t>
+              <a:t>4/14/2019</a:t>
             </a:fld>
             <a:endParaRPr lang="en-US" dirty="0"/>
           </a:p>
@@ -809,7 +809,7 @@
           <a:p>
             <a:fld id="{C17442BA-8611-45A4-B205-589CF9359DD4}" type="datetimeFigureOut">
               <a:rPr lang="en-US" smtClean="0"/>
-              <a:t>4/10/2019</a:t>
+              <a:t>4/14/2019</a:t>
             </a:fld>
             <a:endParaRPr lang="en-US" dirty="0"/>
           </a:p>
@@ -1017,7 +1017,7 @@
           <a:p>
             <a:fld id="{C17442BA-8611-45A4-B205-589CF9359DD4}" type="datetimeFigureOut">
               <a:rPr lang="en-US" smtClean="0"/>
-              <a:t>4/10/2019</a:t>
+              <a:t>4/14/2019</a:t>
             </a:fld>
             <a:endParaRPr lang="en-US" dirty="0"/>
           </a:p>
@@ -1215,7 +1215,7 @@
           <a:p>
             <a:fld id="{C17442BA-8611-45A4-B205-589CF9359DD4}" type="datetimeFigureOut">
               <a:rPr lang="en-US" smtClean="0"/>
-              <a:t>4/10/2019</a:t>
+              <a:t>4/14/2019</a:t>
             </a:fld>
             <a:endParaRPr lang="en-US" dirty="0"/>
           </a:p>
@@ -1490,7 +1490,7 @@
           <a:p>
             <a:fld id="{C17442BA-8611-45A4-B205-589CF9359DD4}" type="datetimeFigureOut">
               <a:rPr lang="en-US" smtClean="0"/>
-              <a:t>4/10/2019</a:t>
+              <a:t>4/14/2019</a:t>
             </a:fld>
             <a:endParaRPr lang="en-US" dirty="0"/>
           </a:p>
@@ -1755,7 +1755,7 @@
           <a:p>
             <a:fld id="{C17442BA-8611-45A4-B205-589CF9359DD4}" type="datetimeFigureOut">
               <a:rPr lang="en-US" smtClean="0"/>
-              <a:t>4/10/2019</a:t>
+              <a:t>4/14/2019</a:t>
             </a:fld>
             <a:endParaRPr lang="en-US" dirty="0"/>
           </a:p>
@@ -2167,7 +2167,7 @@
           <a:p>
             <a:fld id="{C17442BA-8611-45A4-B205-589CF9359DD4}" type="datetimeFigureOut">
               <a:rPr lang="en-US" smtClean="0"/>
-              <a:t>4/10/2019</a:t>
+              <a:t>4/14/2019</a:t>
             </a:fld>
             <a:endParaRPr lang="en-US" dirty="0"/>
           </a:p>
@@ -2308,7 +2308,7 @@
           <a:p>
             <a:fld id="{C17442BA-8611-45A4-B205-589CF9359DD4}" type="datetimeFigureOut">
               <a:rPr lang="en-US" smtClean="0"/>
-              <a:t>4/10/2019</a:t>
+              <a:t>4/14/2019</a:t>
             </a:fld>
             <a:endParaRPr lang="en-US" dirty="0"/>
           </a:p>
@@ -2421,7 +2421,7 @@
           <a:p>
             <a:fld id="{C17442BA-8611-45A4-B205-589CF9359DD4}" type="datetimeFigureOut">
               <a:rPr lang="en-US" smtClean="0"/>
-              <a:t>4/10/2019</a:t>
+              <a:t>4/14/2019</a:t>
             </a:fld>
             <a:endParaRPr lang="en-US" dirty="0"/>
           </a:p>
@@ -2732,7 +2732,7 @@
           <a:p>
             <a:fld id="{C17442BA-8611-45A4-B205-589CF9359DD4}" type="datetimeFigureOut">
               <a:rPr lang="en-US" smtClean="0"/>
-              <a:t>4/10/2019</a:t>
+              <a:t>4/14/2019</a:t>
             </a:fld>
             <a:endParaRPr lang="en-US" dirty="0"/>
           </a:p>
@@ -3020,7 +3020,7 @@
           <a:p>
             <a:fld id="{C17442BA-8611-45A4-B205-589CF9359DD4}" type="datetimeFigureOut">
               <a:rPr lang="en-US" smtClean="0"/>
-              <a:t>4/10/2019</a:t>
+              <a:t>4/14/2019</a:t>
             </a:fld>
             <a:endParaRPr lang="en-US" dirty="0"/>
           </a:p>
@@ -3261,7 +3261,7 @@
           <a:p>
             <a:fld id="{C17442BA-8611-45A4-B205-589CF9359DD4}" type="datetimeFigureOut">
               <a:rPr lang="en-US" smtClean="0"/>
-              <a:t>4/10/2019</a:t>
+              <a:t>4/14/2019</a:t>
             </a:fld>
             <a:endParaRPr lang="en-US" dirty="0"/>
           </a:p>
@@ -4072,8 +4072,8 @@
         </p:nvSpPr>
         <p:spPr>
           <a:xfrm>
-            <a:off x="2625143" y="-46769"/>
-            <a:ext cx="1219200" cy="467684"/>
+            <a:off x="2520199" y="-48164"/>
+            <a:ext cx="1414475" cy="438910"/>
           </a:xfrm>
           <a:prstGeom prst="rect">
             <a:avLst/>
@@ -4119,12 +4119,12 @@
           <a:p>
             <a:pPr algn="ctr"/>
             <a:r>
-              <a:rPr lang="en-US" sz="1600" dirty="0">
+              <a:rPr lang="en-US" sz="1600" dirty="0" err="1">
                 <a:solidFill>
                   <a:schemeClr val="bg1"/>
                 </a:solidFill>
               </a:rPr>
-              <a:t>BookParser</a:t>
+              <a:t>TrackerParser</a:t>
             </a:r>
             <a:endParaRPr lang="en-SG" sz="1600" dirty="0">
               <a:solidFill>

</xml_diff>